<commit_message>
slides for lab meeting.
</commit_message>
<xml_diff>
--- a/Summary/20210317_demo_for_ccgb_rotation_updat.pptx
+++ b/Summary/20210317_demo_for_ccgb_rotation_updat.pptx
@@ -4388,7 +4388,7 @@
         <p:spPr>
           <a:xfrm>
             <a:off x="471948" y="4847303"/>
-            <a:ext cx="8185318" cy="1754326"/>
+            <a:ext cx="8789201" cy="1754326"/>
           </a:xfrm>
           <a:prstGeom prst="rect">
             <a:avLst/>
@@ -4455,7 +4455,7 @@
             </a:pPr>
             <a:r>
               <a:rPr lang="en-US" dirty="0"/>
-              <a:t>For this data set, most of the data is shifted left, which suggests </a:t>
+              <a:t>For this data set, most of the data is shifted left, which suggests weak </a:t>
             </a:r>
             <a:r>
               <a:rPr lang="en-US" i="1" dirty="0"/>
@@ -4787,7 +4787,7 @@
         <p:spPr>
           <a:xfrm>
             <a:off x="471948" y="4847303"/>
-            <a:ext cx="8185318" cy="1754326"/>
+            <a:ext cx="8789201" cy="1754326"/>
           </a:xfrm>
           <a:prstGeom prst="rect">
             <a:avLst/>
@@ -4854,7 +4854,11 @@
             </a:pPr>
             <a:r>
               <a:rPr lang="en-US" dirty="0"/>
-              <a:t>For this data set, most of the data is shifted left, which suggests </a:t>
+              <a:t>For this data set, most of the data is shifted left, </a:t>
+            </a:r>
+            <a:r>
+              <a:rPr lang="en-US"/>
+              <a:t>which suggests weak </a:t>
             </a:r>
             <a:r>
               <a:rPr lang="en-US" i="1" dirty="0"/>
@@ -5170,6 +5174,31 @@
             </a:r>
           </a:p>
           <a:p>
+            <a:r>
+              <a:rPr lang="en-US" dirty="0">
+                <a:latin typeface="Yu Gothic" panose="020B0400000000000000" pitchFamily="34" charset="-128"/>
+                <a:ea typeface="Yu Gothic" panose="020B0400000000000000" pitchFamily="34" charset="-128"/>
+                <a:sym typeface="Wingdings" panose="05000000000000000000" pitchFamily="2" charset="2"/>
+              </a:rPr>
+              <a:t>Compute log likelihoods</a:t>
+            </a:r>
+          </a:p>
+          <a:p>
+            <a:r>
+              <a:rPr lang="en-US">
+                <a:latin typeface="Yu Gothic" panose="020B0400000000000000" pitchFamily="34" charset="-128"/>
+                <a:ea typeface="Yu Gothic" panose="020B0400000000000000" pitchFamily="34" charset="-128"/>
+                <a:sym typeface="Wingdings" panose="05000000000000000000" pitchFamily="2" charset="2"/>
+              </a:rPr>
+              <a:t>Remake figure 3</a:t>
+            </a:r>
+            <a:endParaRPr lang="en-US" dirty="0">
+              <a:latin typeface="Yu Gothic" panose="020B0400000000000000" pitchFamily="34" charset="-128"/>
+              <a:ea typeface="Yu Gothic" panose="020B0400000000000000" pitchFamily="34" charset="-128"/>
+              <a:sym typeface="Wingdings" panose="05000000000000000000" pitchFamily="2" charset="2"/>
+            </a:endParaRPr>
+          </a:p>
+          <a:p>
             <a:endParaRPr lang="en-US" dirty="0">
               <a:latin typeface="Yu Gothic" panose="020B0400000000000000" pitchFamily="34" charset="-128"/>
               <a:ea typeface="Yu Gothic" panose="020B0400000000000000" pitchFamily="34" charset="-128"/>
@@ -5275,7 +5304,7 @@
         <p:spPr/>
         <p:txBody>
           <a:bodyPr>
-            <a:normAutofit fontScale="85000" lnSpcReduction="20000"/>
+            <a:normAutofit fontScale="77500" lnSpcReduction="20000"/>
           </a:bodyPr>
           <a:lstStyle/>
           <a:p>
@@ -5285,6 +5314,25 @@
                 <a:ea typeface="Yu Gothic" panose="020B0400000000000000" pitchFamily="34" charset="-128"/>
               </a:rPr>
               <a:t>Overall goal: determine if our method is what results in getting these types of parameters</a:t>
+            </a:r>
+          </a:p>
+          <a:p>
+            <a:r>
+              <a:rPr lang="en-US" dirty="0">
+                <a:latin typeface="Yu Gothic" panose="020B0400000000000000" pitchFamily="34" charset="-128"/>
+                <a:ea typeface="Yu Gothic" panose="020B0400000000000000" pitchFamily="34" charset="-128"/>
+              </a:rPr>
+              <a:t>Poisson vs. Multinomial log likelihood</a:t>
+            </a:r>
+          </a:p>
+          <a:p>
+            <a:pPr lvl="1"/>
+            <a:r>
+              <a:rPr lang="en-US" dirty="0">
+                <a:latin typeface="Yu Gothic" panose="020B0400000000000000" pitchFamily="34" charset="-128"/>
+                <a:ea typeface="Yu Gothic" panose="020B0400000000000000" pitchFamily="34" charset="-128"/>
+              </a:rPr>
+              <a:t>Neutral selection on non-synonymous vs. non-neutral selection on non-synonymous</a:t>
             </a:r>
           </a:p>
           <a:p>
@@ -6546,7 +6594,7 @@
         <p:spPr>
           <a:xfrm>
             <a:off x="471948" y="4847303"/>
-            <a:ext cx="8185318" cy="1754326"/>
+            <a:ext cx="8789201" cy="1754326"/>
           </a:xfrm>
           <a:prstGeom prst="rect">
             <a:avLst/>
@@ -6613,7 +6661,7 @@
             </a:pPr>
             <a:r>
               <a:rPr lang="en-US" dirty="0"/>
-              <a:t>For this data set, most of the data is shifted left, which suggests </a:t>
+              <a:t>For this data set, most of the data is shifted left, which suggests weak </a:t>
             </a:r>
             <a:r>
               <a:rPr lang="en-US" i="1" dirty="0"/>

</xml_diff>